<commit_message>
fixing logo so that it represents an actual matrix operation.
</commit_message>
<xml_diff>
--- a/docs/logo/EJML_logo.pptx
+++ b/docs/logo/EJML_logo.pptx
@@ -289,7 +289,8 @@
           <a:p>
             <a:fld id="{4CC98F02-A3D9-41C3-A452-47E649849D9C}" type="datetimeFigureOut">
               <a:rPr lang="en-US" smtClean="0"/>
-              <a:t>7/8/2010</a:t>
+              <a:pPr/>
+              <a:t>7/15/2010</a:t>
             </a:fld>
             <a:endParaRPr lang="en-US"/>
           </a:p>
@@ -331,6 +332,7 @@
           <a:p>
             <a:fld id="{E76BD46F-515B-4129-8B2F-F19ACCE358B7}" type="slidenum">
               <a:rPr lang="en-US" smtClean="0"/>
+              <a:pPr/>
               <a:t>‹#›</a:t>
             </a:fld>
             <a:endParaRPr lang="en-US"/>
@@ -454,7 +456,8 @@
           <a:p>
             <a:fld id="{4CC98F02-A3D9-41C3-A452-47E649849D9C}" type="datetimeFigureOut">
               <a:rPr lang="en-US" smtClean="0"/>
-              <a:t>7/8/2010</a:t>
+              <a:pPr/>
+              <a:t>7/15/2010</a:t>
             </a:fld>
             <a:endParaRPr lang="en-US"/>
           </a:p>
@@ -496,6 +499,7 @@
           <a:p>
             <a:fld id="{E76BD46F-515B-4129-8B2F-F19ACCE358B7}" type="slidenum">
               <a:rPr lang="en-US" smtClean="0"/>
+              <a:pPr/>
               <a:t>‹#›</a:t>
             </a:fld>
             <a:endParaRPr lang="en-US"/>
@@ -629,7 +633,8 @@
           <a:p>
             <a:fld id="{4CC98F02-A3D9-41C3-A452-47E649849D9C}" type="datetimeFigureOut">
               <a:rPr lang="en-US" smtClean="0"/>
-              <a:t>7/8/2010</a:t>
+              <a:pPr/>
+              <a:t>7/15/2010</a:t>
             </a:fld>
             <a:endParaRPr lang="en-US"/>
           </a:p>
@@ -671,6 +676,7 @@
           <a:p>
             <a:fld id="{E76BD46F-515B-4129-8B2F-F19ACCE358B7}" type="slidenum">
               <a:rPr lang="en-US" smtClean="0"/>
+              <a:pPr/>
               <a:t>‹#›</a:t>
             </a:fld>
             <a:endParaRPr lang="en-US"/>
@@ -794,7 +800,8 @@
           <a:p>
             <a:fld id="{4CC98F02-A3D9-41C3-A452-47E649849D9C}" type="datetimeFigureOut">
               <a:rPr lang="en-US" smtClean="0"/>
-              <a:t>7/8/2010</a:t>
+              <a:pPr/>
+              <a:t>7/15/2010</a:t>
             </a:fld>
             <a:endParaRPr lang="en-US"/>
           </a:p>
@@ -836,6 +843,7 @@
           <a:p>
             <a:fld id="{E76BD46F-515B-4129-8B2F-F19ACCE358B7}" type="slidenum">
               <a:rPr lang="en-US" smtClean="0"/>
+              <a:pPr/>
               <a:t>‹#›</a:t>
             </a:fld>
             <a:endParaRPr lang="en-US"/>
@@ -1035,7 +1043,8 @@
           <a:p>
             <a:fld id="{4CC98F02-A3D9-41C3-A452-47E649849D9C}" type="datetimeFigureOut">
               <a:rPr lang="en-US" smtClean="0"/>
-              <a:t>7/8/2010</a:t>
+              <a:pPr/>
+              <a:t>7/15/2010</a:t>
             </a:fld>
             <a:endParaRPr lang="en-US"/>
           </a:p>
@@ -1077,6 +1086,7 @@
           <a:p>
             <a:fld id="{E76BD46F-515B-4129-8B2F-F19ACCE358B7}" type="slidenum">
               <a:rPr lang="en-US" smtClean="0"/>
+              <a:pPr/>
               <a:t>‹#›</a:t>
             </a:fld>
             <a:endParaRPr lang="en-US"/>
@@ -1318,7 +1328,8 @@
           <a:p>
             <a:fld id="{4CC98F02-A3D9-41C3-A452-47E649849D9C}" type="datetimeFigureOut">
               <a:rPr lang="en-US" smtClean="0"/>
-              <a:t>7/8/2010</a:t>
+              <a:pPr/>
+              <a:t>7/15/2010</a:t>
             </a:fld>
             <a:endParaRPr lang="en-US"/>
           </a:p>
@@ -1360,6 +1371,7 @@
           <a:p>
             <a:fld id="{E76BD46F-515B-4129-8B2F-F19ACCE358B7}" type="slidenum">
               <a:rPr lang="en-US" smtClean="0"/>
+              <a:pPr/>
               <a:t>‹#›</a:t>
             </a:fld>
             <a:endParaRPr lang="en-US"/>
@@ -1735,7 +1747,8 @@
           <a:p>
             <a:fld id="{4CC98F02-A3D9-41C3-A452-47E649849D9C}" type="datetimeFigureOut">
               <a:rPr lang="en-US" smtClean="0"/>
-              <a:t>7/8/2010</a:t>
+              <a:pPr/>
+              <a:t>7/15/2010</a:t>
             </a:fld>
             <a:endParaRPr lang="en-US"/>
           </a:p>
@@ -1777,6 +1790,7 @@
           <a:p>
             <a:fld id="{E76BD46F-515B-4129-8B2F-F19ACCE358B7}" type="slidenum">
               <a:rPr lang="en-US" smtClean="0"/>
+              <a:pPr/>
               <a:t>‹#›</a:t>
             </a:fld>
             <a:endParaRPr lang="en-US"/>
@@ -1848,7 +1862,8 @@
           <a:p>
             <a:fld id="{4CC98F02-A3D9-41C3-A452-47E649849D9C}" type="datetimeFigureOut">
               <a:rPr lang="en-US" smtClean="0"/>
-              <a:t>7/8/2010</a:t>
+              <a:pPr/>
+              <a:t>7/15/2010</a:t>
             </a:fld>
             <a:endParaRPr lang="en-US"/>
           </a:p>
@@ -1890,6 +1905,7 @@
           <a:p>
             <a:fld id="{E76BD46F-515B-4129-8B2F-F19ACCE358B7}" type="slidenum">
               <a:rPr lang="en-US" smtClean="0"/>
+              <a:pPr/>
               <a:t>‹#›</a:t>
             </a:fld>
             <a:endParaRPr lang="en-US"/>
@@ -1938,7 +1954,8 @@
           <a:p>
             <a:fld id="{4CC98F02-A3D9-41C3-A452-47E649849D9C}" type="datetimeFigureOut">
               <a:rPr lang="en-US" smtClean="0"/>
-              <a:t>7/8/2010</a:t>
+              <a:pPr/>
+              <a:t>7/15/2010</a:t>
             </a:fld>
             <a:endParaRPr lang="en-US"/>
           </a:p>
@@ -1980,6 +1997,7 @@
           <a:p>
             <a:fld id="{E76BD46F-515B-4129-8B2F-F19ACCE358B7}" type="slidenum">
               <a:rPr lang="en-US" smtClean="0"/>
+              <a:pPr/>
               <a:t>‹#›</a:t>
             </a:fld>
             <a:endParaRPr lang="en-US"/>
@@ -2210,7 +2228,8 @@
           <a:p>
             <a:fld id="{4CC98F02-A3D9-41C3-A452-47E649849D9C}" type="datetimeFigureOut">
               <a:rPr lang="en-US" smtClean="0"/>
-              <a:t>7/8/2010</a:t>
+              <a:pPr/>
+              <a:t>7/15/2010</a:t>
             </a:fld>
             <a:endParaRPr lang="en-US"/>
           </a:p>
@@ -2252,6 +2271,7 @@
           <a:p>
             <a:fld id="{E76BD46F-515B-4129-8B2F-F19ACCE358B7}" type="slidenum">
               <a:rPr lang="en-US" smtClean="0"/>
+              <a:pPr/>
               <a:t>‹#›</a:t>
             </a:fld>
             <a:endParaRPr lang="en-US"/>
@@ -2458,7 +2478,8 @@
           <a:p>
             <a:fld id="{4CC98F02-A3D9-41C3-A452-47E649849D9C}" type="datetimeFigureOut">
               <a:rPr lang="en-US" smtClean="0"/>
-              <a:t>7/8/2010</a:t>
+              <a:pPr/>
+              <a:t>7/15/2010</a:t>
             </a:fld>
             <a:endParaRPr lang="en-US"/>
           </a:p>
@@ -2500,6 +2521,7 @@
           <a:p>
             <a:fld id="{E76BD46F-515B-4129-8B2F-F19ACCE358B7}" type="slidenum">
               <a:rPr lang="en-US" smtClean="0"/>
+              <a:pPr/>
               <a:t>‹#›</a:t>
             </a:fld>
             <a:endParaRPr lang="en-US"/>
@@ -2666,7 +2688,8 @@
           <a:p>
             <a:fld id="{4CC98F02-A3D9-41C3-A452-47E649849D9C}" type="datetimeFigureOut">
               <a:rPr lang="en-US" smtClean="0"/>
-              <a:t>7/8/2010</a:t>
+              <a:pPr/>
+              <a:t>7/15/2010</a:t>
             </a:fld>
             <a:endParaRPr lang="en-US"/>
           </a:p>
@@ -2744,6 +2767,7 @@
           <a:p>
             <a:fld id="{E76BD46F-515B-4129-8B2F-F19ACCE358B7}" type="slidenum">
               <a:rPr lang="en-US" smtClean="0"/>
+              <a:pPr/>
               <a:t>‹#›</a:t>
             </a:fld>
             <a:endParaRPr lang="en-US"/>
@@ -3321,10 +3345,7 @@
               <a:avLst/>
             </a:prstGeom>
             <a:solidFill>
-              <a:schemeClr val="tx2">
-                <a:lumMod val="60000"/>
-                <a:lumOff val="40000"/>
-              </a:schemeClr>
+              <a:schemeClr val="bg1"/>
             </a:solidFill>
             <a:ln>
               <a:solidFill>
@@ -3630,10 +3651,7 @@
               <a:avLst/>
             </a:prstGeom>
             <a:solidFill>
-              <a:schemeClr val="tx2">
-                <a:lumMod val="40000"/>
-                <a:lumOff val="60000"/>
-              </a:schemeClr>
+              <a:schemeClr val="bg1"/>
             </a:solidFill>
             <a:ln>
               <a:solidFill>
@@ -4354,7 +4372,7 @@
         </p:nvGrpSpPr>
         <p:grpSpPr>
           <a:xfrm>
-            <a:off x="3444240" y="2164080"/>
+            <a:off x="3444240" y="1962912"/>
             <a:ext cx="1219200" cy="2209800"/>
             <a:chOff x="4953000" y="1981200"/>
             <a:chExt cx="1219200" cy="2209800"/>
@@ -4560,15 +4578,49 @@
           <a:chExt cx="0" cy="0"/>
         </a:xfrm>
       </p:grpSpPr>
+      <p:sp>
+        <p:nvSpPr>
+          <p:cNvPr id="36" name="TextBox 35"/>
+          <p:cNvSpPr txBox="1"/>
+          <p:nvPr/>
+        </p:nvSpPr>
+        <p:spPr>
+          <a:xfrm>
+            <a:off x="1655125" y="1917063"/>
+            <a:ext cx="4531109" cy="2215991"/>
+          </a:xfrm>
+          <a:prstGeom prst="rect">
+            <a:avLst/>
+          </a:prstGeom>
+          <a:noFill/>
+        </p:spPr>
+        <p:txBody>
+          <a:bodyPr wrap="square" rtlCol="0">
+            <a:spAutoFit/>
+          </a:bodyPr>
+          <a:lstStyle/>
+          <a:p>
+            <a:r>
+              <a:rPr lang="en-US" sz="13800" dirty="0" smtClean="0">
+                <a:latin typeface="Berlin Sans FB Demi" pitchFamily="34" charset="0"/>
+              </a:rPr>
+              <a:t>EJML</a:t>
+            </a:r>
+            <a:endParaRPr lang="en-US" sz="13800" dirty="0">
+              <a:latin typeface="Berlin Sans FB Demi" pitchFamily="34" charset="0"/>
+            </a:endParaRPr>
+          </a:p>
+        </p:txBody>
+      </p:sp>
       <p:grpSp>
         <p:nvGrpSpPr>
-          <p:cNvPr id="4" name="Group 3"/>
+          <p:cNvPr id="37" name="Group 36"/>
           <p:cNvGrpSpPr/>
           <p:nvPr/>
         </p:nvGrpSpPr>
         <p:grpSpPr>
           <a:xfrm>
-            <a:off x="5913120" y="2511552"/>
+            <a:off x="5858256" y="2529840"/>
             <a:ext cx="1143000" cy="1143000"/>
             <a:chOff x="2895600" y="2438400"/>
             <a:chExt cx="1143000" cy="1143000"/>
@@ -4576,7 +4628,7 @@
         </p:grpSpPr>
         <p:sp>
           <p:nvSpPr>
-            <p:cNvPr id="5" name="Rectangle 4"/>
+            <p:cNvPr id="38" name="Rectangle 37"/>
             <p:cNvSpPr/>
             <p:nvPr/>
           </p:nvSpPr>
@@ -4629,7 +4681,7 @@
         </p:sp>
         <p:sp>
           <p:nvSpPr>
-            <p:cNvPr id="6" name="Rectangle 5"/>
+            <p:cNvPr id="39" name="Rectangle 38"/>
             <p:cNvSpPr/>
             <p:nvPr/>
           </p:nvSpPr>
@@ -4682,7 +4734,7 @@
         </p:sp>
         <p:sp>
           <p:nvSpPr>
-            <p:cNvPr id="7" name="Rectangle 6"/>
+            <p:cNvPr id="40" name="Rectangle 39"/>
             <p:cNvSpPr/>
             <p:nvPr/>
           </p:nvSpPr>
@@ -4732,7 +4784,7 @@
         </p:sp>
         <p:sp>
           <p:nvSpPr>
-            <p:cNvPr id="8" name="Rectangle 7"/>
+            <p:cNvPr id="41" name="Rectangle 40"/>
             <p:cNvSpPr/>
             <p:nvPr/>
           </p:nvSpPr>
@@ -4782,7 +4834,7 @@
         </p:sp>
         <p:sp>
           <p:nvSpPr>
-            <p:cNvPr id="9" name="Rectangle 8"/>
+            <p:cNvPr id="42" name="Rectangle 41"/>
             <p:cNvSpPr/>
             <p:nvPr/>
           </p:nvSpPr>
@@ -4832,7 +4884,7 @@
         </p:sp>
         <p:sp>
           <p:nvSpPr>
-            <p:cNvPr id="10" name="Rectangle 9"/>
+            <p:cNvPr id="43" name="Rectangle 42"/>
             <p:cNvSpPr/>
             <p:nvPr/>
           </p:nvSpPr>
@@ -4845,10 +4897,7 @@
               <a:avLst/>
             </a:prstGeom>
             <a:solidFill>
-              <a:schemeClr val="tx2">
-                <a:lumMod val="60000"/>
-                <a:lumOff val="40000"/>
-              </a:schemeClr>
+              <a:schemeClr val="bg1"/>
             </a:solidFill>
             <a:ln>
               <a:solidFill>
@@ -4885,7 +4934,7 @@
         </p:sp>
         <p:sp>
           <p:nvSpPr>
-            <p:cNvPr id="11" name="Rectangle 10"/>
+            <p:cNvPr id="44" name="Rectangle 43"/>
             <p:cNvSpPr/>
             <p:nvPr/>
           </p:nvSpPr>
@@ -4938,7 +4987,7 @@
         </p:sp>
         <p:sp>
           <p:nvSpPr>
-            <p:cNvPr id="12" name="Rectangle 11"/>
+            <p:cNvPr id="45" name="Rectangle 44"/>
             <p:cNvSpPr/>
             <p:nvPr/>
           </p:nvSpPr>
@@ -4991,7 +5040,7 @@
         </p:sp>
         <p:sp>
           <p:nvSpPr>
-            <p:cNvPr id="13" name="Rectangle 12"/>
+            <p:cNvPr id="46" name="Rectangle 45"/>
             <p:cNvSpPr/>
             <p:nvPr/>
           </p:nvSpPr>
@@ -5041,7 +5090,7 @@
         </p:sp>
         <p:sp>
           <p:nvSpPr>
-            <p:cNvPr id="14" name="Rectangle 13"/>
+            <p:cNvPr id="47" name="Rectangle 46"/>
             <p:cNvSpPr/>
             <p:nvPr/>
           </p:nvSpPr>
@@ -5091,7 +5140,7 @@
         </p:sp>
         <p:sp>
           <p:nvSpPr>
-            <p:cNvPr id="15" name="Rectangle 14"/>
+            <p:cNvPr id="48" name="Rectangle 47"/>
             <p:cNvSpPr/>
             <p:nvPr/>
           </p:nvSpPr>
@@ -5141,7 +5190,7 @@
         </p:sp>
         <p:sp>
           <p:nvSpPr>
-            <p:cNvPr id="16" name="Rectangle 15"/>
+            <p:cNvPr id="49" name="Rectangle 48"/>
             <p:cNvSpPr/>
             <p:nvPr/>
           </p:nvSpPr>
@@ -5154,10 +5203,7 @@
               <a:avLst/>
             </a:prstGeom>
             <a:solidFill>
-              <a:schemeClr val="tx2">
-                <a:lumMod val="40000"/>
-                <a:lumOff val="60000"/>
-              </a:schemeClr>
+              <a:schemeClr val="bg1"/>
             </a:solidFill>
             <a:ln>
               <a:solidFill>
@@ -5194,7 +5240,7 @@
         </p:sp>
         <p:sp>
           <p:nvSpPr>
-            <p:cNvPr id="17" name="Rectangle 16"/>
+            <p:cNvPr id="50" name="Rectangle 49"/>
             <p:cNvSpPr/>
             <p:nvPr/>
           </p:nvSpPr>
@@ -5247,7 +5293,7 @@
         </p:sp>
         <p:sp>
           <p:nvSpPr>
-            <p:cNvPr id="18" name="Rectangle 17"/>
+            <p:cNvPr id="51" name="Rectangle 50"/>
             <p:cNvSpPr/>
             <p:nvPr/>
           </p:nvSpPr>
@@ -5300,7 +5346,7 @@
         </p:sp>
         <p:sp>
           <p:nvSpPr>
-            <p:cNvPr id="19" name="Rectangle 18"/>
+            <p:cNvPr id="52" name="Rectangle 51"/>
             <p:cNvSpPr/>
             <p:nvPr/>
           </p:nvSpPr>
@@ -5353,7 +5399,7 @@
         </p:sp>
         <p:sp>
           <p:nvSpPr>
-            <p:cNvPr id="20" name="Rectangle 19"/>
+            <p:cNvPr id="53" name="Rectangle 52"/>
             <p:cNvSpPr/>
             <p:nvPr/>
           </p:nvSpPr>
@@ -5403,7 +5449,7 @@
         </p:sp>
         <p:sp>
           <p:nvSpPr>
-            <p:cNvPr id="21" name="Rectangle 20"/>
+            <p:cNvPr id="54" name="Rectangle 53"/>
             <p:cNvSpPr/>
             <p:nvPr/>
           </p:nvSpPr>
@@ -5453,7 +5499,7 @@
         </p:sp>
         <p:sp>
           <p:nvSpPr>
-            <p:cNvPr id="22" name="Rectangle 21"/>
+            <p:cNvPr id="55" name="Rectangle 54"/>
             <p:cNvSpPr/>
             <p:nvPr/>
           </p:nvSpPr>
@@ -5506,7 +5552,7 @@
         </p:sp>
         <p:sp>
           <p:nvSpPr>
-            <p:cNvPr id="23" name="Rectangle 22"/>
+            <p:cNvPr id="56" name="Rectangle 55"/>
             <p:cNvSpPr/>
             <p:nvPr/>
           </p:nvSpPr>
@@ -5559,7 +5605,7 @@
         </p:sp>
         <p:sp>
           <p:nvSpPr>
-            <p:cNvPr id="24" name="Rectangle 23"/>
+            <p:cNvPr id="57" name="Rectangle 56"/>
             <p:cNvSpPr/>
             <p:nvPr/>
           </p:nvSpPr>
@@ -5612,7 +5658,7 @@
         </p:sp>
         <p:sp>
           <p:nvSpPr>
-            <p:cNvPr id="25" name="Rectangle 24"/>
+            <p:cNvPr id="58" name="Rectangle 57"/>
             <p:cNvSpPr/>
             <p:nvPr/>
           </p:nvSpPr>
@@ -5662,7 +5708,7 @@
         </p:sp>
         <p:sp>
           <p:nvSpPr>
-            <p:cNvPr id="26" name="Rectangle 25"/>
+            <p:cNvPr id="59" name="Rectangle 58"/>
             <p:cNvSpPr/>
             <p:nvPr/>
           </p:nvSpPr>
@@ -5712,7 +5758,7 @@
         </p:sp>
         <p:sp>
           <p:nvSpPr>
-            <p:cNvPr id="27" name="Rectangle 26"/>
+            <p:cNvPr id="60" name="Rectangle 59"/>
             <p:cNvSpPr/>
             <p:nvPr/>
           </p:nvSpPr>
@@ -5765,7 +5811,7 @@
         </p:sp>
         <p:sp>
           <p:nvSpPr>
-            <p:cNvPr id="28" name="Rectangle 27"/>
+            <p:cNvPr id="61" name="Rectangle 60"/>
             <p:cNvSpPr/>
             <p:nvPr/>
           </p:nvSpPr>
@@ -5818,7 +5864,7 @@
         </p:sp>
         <p:sp>
           <p:nvSpPr>
-            <p:cNvPr id="29" name="Rectangle 28"/>
+            <p:cNvPr id="62" name="Rectangle 61"/>
             <p:cNvSpPr/>
             <p:nvPr/>
           </p:nvSpPr>
@@ -5872,13 +5918,13 @@
       </p:grpSp>
       <p:grpSp>
         <p:nvGrpSpPr>
-          <p:cNvPr id="30" name="Group 29"/>
+          <p:cNvPr id="63" name="Group 62"/>
           <p:cNvGrpSpPr/>
           <p:nvPr/>
         </p:nvGrpSpPr>
         <p:grpSpPr>
           <a:xfrm>
-            <a:off x="6461760" y="2237232"/>
+            <a:off x="6406896" y="2054352"/>
             <a:ext cx="1219200" cy="2209800"/>
             <a:chOff x="4953000" y="1981200"/>
             <a:chExt cx="1219200" cy="2209800"/>
@@ -5886,7 +5932,7 @@
         </p:grpSpPr>
         <p:cxnSp>
           <p:nvCxnSpPr>
-            <p:cNvPr id="31" name="Straight Arrow Connector 30"/>
+            <p:cNvPr id="64" name="Straight Arrow Connector 63"/>
             <p:cNvCxnSpPr/>
             <p:nvPr/>
           </p:nvCxnSpPr>
@@ -5922,7 +5968,7 @@
         </p:cxnSp>
         <p:cxnSp>
           <p:nvCxnSpPr>
-            <p:cNvPr id="32" name="Straight Arrow Connector 31"/>
+            <p:cNvPr id="65" name="Straight Arrow Connector 64"/>
             <p:cNvCxnSpPr/>
             <p:nvPr/>
           </p:nvCxnSpPr>
@@ -5958,7 +6004,7 @@
         </p:cxnSp>
         <p:cxnSp>
           <p:nvCxnSpPr>
-            <p:cNvPr id="33" name="Straight Arrow Connector 32"/>
+            <p:cNvPr id="66" name="Straight Arrow Connector 65"/>
             <p:cNvCxnSpPr/>
             <p:nvPr/>
           </p:nvCxnSpPr>
@@ -5994,7 +6040,7 @@
         </p:cxnSp>
         <p:sp>
           <p:nvSpPr>
-            <p:cNvPr id="34" name="TextBox 33"/>
+            <p:cNvPr id="67" name="TextBox 66"/>
             <p:cNvSpPr txBox="1"/>
             <p:nvPr/>
           </p:nvSpPr>
@@ -6027,7 +6073,7 @@
         </p:sp>
         <p:sp>
           <p:nvSpPr>
-            <p:cNvPr id="35" name="TextBox 34"/>
+            <p:cNvPr id="68" name="TextBox 67"/>
             <p:cNvSpPr txBox="1"/>
             <p:nvPr/>
           </p:nvSpPr>
@@ -6059,40 +6105,6 @@
           </p:txBody>
         </p:sp>
       </p:grpSp>
-      <p:sp>
-        <p:nvSpPr>
-          <p:cNvPr id="36" name="TextBox 35"/>
-          <p:cNvSpPr txBox="1"/>
-          <p:nvPr/>
-        </p:nvSpPr>
-        <p:spPr>
-          <a:xfrm>
-            <a:off x="1655125" y="1917063"/>
-            <a:ext cx="4531109" cy="2215991"/>
-          </a:xfrm>
-          <a:prstGeom prst="rect">
-            <a:avLst/>
-          </a:prstGeom>
-          <a:noFill/>
-        </p:spPr>
-        <p:txBody>
-          <a:bodyPr wrap="square" rtlCol="0">
-            <a:spAutoFit/>
-          </a:bodyPr>
-          <a:lstStyle/>
-          <a:p>
-            <a:r>
-              <a:rPr lang="en-US" sz="13800" dirty="0" smtClean="0">
-                <a:latin typeface="Berlin Sans FB Demi" pitchFamily="34" charset="0"/>
-              </a:rPr>
-              <a:t>EJML</a:t>
-            </a:r>
-            <a:endParaRPr lang="en-US" sz="13800" dirty="0">
-              <a:latin typeface="Berlin Sans FB Demi" pitchFamily="34" charset="0"/>
-            </a:endParaRPr>
-          </a:p>
-        </p:txBody>
-      </p:sp>
     </p:spTree>
   </p:cSld>
   <p:clrMapOvr>

</xml_diff>